<commit_message>
Ajuste Microcontrolador 21/10/2024 2024.2
</commit_message>
<xml_diff>
--- a/01 Classes/Aula 08 - Programação Microcontroladores - Periféricos Externos- Mostradores e Interrupções.pptx
+++ b/01 Classes/Aula 08 - Programação Microcontroladores - Periféricos Externos- Mostradores e Interrupções.pptx
@@ -4964,7 +4964,27 @@
                 <a:latin typeface="Times New Roman" panose="02020603050405020304" pitchFamily="18" charset="0"/>
                 <a:cs typeface="Times New Roman" panose="02020603050405020304" pitchFamily="18" charset="0"/>
               </a:rPr>
-              <a:t>Quantidade de pinos disponíveis no Arduino é limitada, pois após </a:t>
+              <a:t>Quantidade de pinos disponíveis no Arduino é limitada</a:t>
+            </a:r>
+            <a:r>
+              <a:rPr lang="pt-BR" sz="2000">
+                <a:solidFill>
+                  <a:schemeClr val="tx1"/>
+                </a:solidFill>
+                <a:latin typeface="Times New Roman" panose="02020603050405020304" pitchFamily="18" charset="0"/>
+                <a:cs typeface="Times New Roman" panose="02020603050405020304" pitchFamily="18" charset="0"/>
+              </a:rPr>
+              <a:t>, pois, </a:t>
+            </a:r>
+            <a:r>
+              <a:rPr lang="pt-BR" sz="2000" dirty="0">
+                <a:solidFill>
+                  <a:schemeClr val="tx1"/>
+                </a:solidFill>
+                <a:latin typeface="Times New Roman" panose="02020603050405020304" pitchFamily="18" charset="0"/>
+                <a:cs typeface="Times New Roman" panose="02020603050405020304" pitchFamily="18" charset="0"/>
+              </a:rPr>
+              <a:t>após </a:t>
             </a:r>
             <a:r>
               <a:rPr lang="pt-BR" sz="2000" b="1" dirty="0">
@@ -8966,10 +8986,28 @@
             <a:pPr marL="0" indent="0" algn="just">
               <a:buNone/>
             </a:pPr>
-            <a:endParaRPr lang="pt-BR" sz="2000" dirty="0">
-              <a:latin typeface="Times New Roman" panose="02020603050405020304" pitchFamily="18" charset="0"/>
-              <a:cs typeface="Times New Roman" panose="02020603050405020304" pitchFamily="18" charset="0"/>
-            </a:endParaRPr>
+            <a:r>
+              <a:rPr lang="pt-BR" sz="2000" dirty="0">
+                <a:latin typeface="Times New Roman" panose="02020603050405020304" pitchFamily="18" charset="0"/>
+                <a:cs typeface="Times New Roman" panose="02020603050405020304" pitchFamily="18" charset="0"/>
+              </a:rPr>
+              <a:t>		</a:t>
+            </a:r>
+            <a:r>
+              <a:rPr lang="pt-BR" sz="2000" dirty="0">
+                <a:latin typeface="Times New Roman" panose="02020603050405020304" pitchFamily="18" charset="0"/>
+                <a:cs typeface="Times New Roman" panose="02020603050405020304" pitchFamily="18" charset="0"/>
+                <a:hlinkClick r:id="rId3"/>
+              </a:rPr>
+              <a:t>https://www.squids.com.br/arduino/index.php/projetos-arduino/projetos-squids/basico/123-projeto-04-pushbutton</a:t>
+            </a:r>
+            <a:r>
+              <a:rPr lang="pt-BR" sz="2000" dirty="0">
+                <a:latin typeface="Times New Roman" panose="02020603050405020304" pitchFamily="18" charset="0"/>
+                <a:cs typeface="Times New Roman" panose="02020603050405020304" pitchFamily="18" charset="0"/>
+              </a:rPr>
+              <a:t> </a:t>
+            </a:r>
           </a:p>
           <a:p>
             <a:pPr marL="0" indent="0" algn="just">
@@ -8986,9 +9024,9 @@
               <a:rPr lang="pt-BR" sz="2000" dirty="0">
                 <a:latin typeface="Times New Roman" panose="02020603050405020304" pitchFamily="18" charset="0"/>
                 <a:cs typeface="Times New Roman" panose="02020603050405020304" pitchFamily="18" charset="0"/>
-                <a:hlinkClick r:id="rId3"/>
-              </a:rPr>
-              <a:t>https://www.squids.com.br/arduino/index.php/projetos-arduino/projetos-squids/basico/123-projeto-04-pushbutton</a:t>
+                <a:hlinkClick r:id="rId4"/>
+              </a:rPr>
+              <a:t>https://tecdicas.com/como-ligar-um-display-lcd-no-arduino-uno/</a:t>
             </a:r>
             <a:r>
               <a:rPr lang="pt-BR" sz="2000" dirty="0">
@@ -11101,7 +11139,7 @@
                 <a:latin typeface="Times New Roman" panose="02020603050405020304" pitchFamily="18" charset="0"/>
                 <a:cs typeface="Times New Roman" panose="02020603050405020304" pitchFamily="18" charset="0"/>
               </a:rPr>
-              <a:t>VDD (pino de alimentação +5V liga ao GND) – </a:t>
+              <a:t>VDD (pino de alimentação +5V liga ao +5V) – </a:t>
             </a:r>
             <a:r>
               <a:rPr lang="pt-BR" sz="1800" b="1" dirty="0">
@@ -11179,7 +11217,7 @@
                 <a:latin typeface="Times New Roman" panose="02020603050405020304" pitchFamily="18" charset="0"/>
                 <a:cs typeface="Times New Roman" panose="02020603050405020304" pitchFamily="18" charset="0"/>
               </a:rPr>
-              <a:t>RW - </a:t>
+              <a:t>R/W - </a:t>
             </a:r>
             <a:r>
               <a:rPr lang="pt-BR" sz="1800" dirty="0" err="1">

</xml_diff>